<commit_message>
renamed references of uddt to udtt
</commit_message>
<xml_diff>
--- a/Datatables_and_Dataframes_to_SQL_Procs/User-defined Table Types.pptx
+++ b/Datatables_and_Dataframes_to_SQL_Procs/User-defined Table Types.pptx
@@ -245,7 +245,7 @@
           <a:p>
             <a:fld id="{3E17F473-D930-40CF-A164-F39E2E601F13}" type="datetimeFigureOut">
               <a:rPr lang="en-US" smtClean="0"/>
-              <a:t>8/17/2023</a:t>
+              <a:t>8/18/2023</a:t>
             </a:fld>
             <a:endParaRPr lang="en-US"/>
           </a:p>
@@ -3689,7 +3689,7 @@
           <a:p>
             <a:fld id="{FAFDAFBD-AA74-4F39-B34D-B8A0CE5CD8B0}" type="datetimeFigureOut">
               <a:rPr lang="en-US" smtClean="0"/>
-              <a:t>8/17/2023</a:t>
+              <a:t>8/18/2023</a:t>
             </a:fld>
             <a:endParaRPr lang="en-US"/>
           </a:p>
@@ -3887,7 +3887,7 @@
           <a:p>
             <a:fld id="{FAFDAFBD-AA74-4F39-B34D-B8A0CE5CD8B0}" type="datetimeFigureOut">
               <a:rPr lang="en-US" smtClean="0"/>
-              <a:t>8/17/2023</a:t>
+              <a:t>8/18/2023</a:t>
             </a:fld>
             <a:endParaRPr lang="en-US"/>
           </a:p>
@@ -4095,7 +4095,7 @@
           <a:p>
             <a:fld id="{FAFDAFBD-AA74-4F39-B34D-B8A0CE5CD8B0}" type="datetimeFigureOut">
               <a:rPr lang="en-US" smtClean="0"/>
-              <a:t>8/17/2023</a:t>
+              <a:t>8/18/2023</a:t>
             </a:fld>
             <a:endParaRPr lang="en-US"/>
           </a:p>
@@ -4890,7 +4890,7 @@
           <a:p>
             <a:fld id="{FAFDAFBD-AA74-4F39-B34D-B8A0CE5CD8B0}" type="datetimeFigureOut">
               <a:rPr lang="en-US" smtClean="0"/>
-              <a:t>8/17/2023</a:t>
+              <a:t>8/18/2023</a:t>
             </a:fld>
             <a:endParaRPr lang="en-US"/>
           </a:p>
@@ -5066,7 +5066,7 @@
           <a:p>
             <a:fld id="{FAFDAFBD-AA74-4F39-B34D-B8A0CE5CD8B0}" type="datetimeFigureOut">
               <a:rPr lang="en-US" smtClean="0"/>
-              <a:t>8/17/2023</a:t>
+              <a:t>8/18/2023</a:t>
             </a:fld>
             <a:endParaRPr lang="en-US"/>
           </a:p>
@@ -5313,7 +5313,7 @@
           <a:p>
             <a:fld id="{FAFDAFBD-AA74-4F39-B34D-B8A0CE5CD8B0}" type="datetimeFigureOut">
               <a:rPr lang="en-US" smtClean="0"/>
-              <a:t>8/17/2023</a:t>
+              <a:t>8/18/2023</a:t>
             </a:fld>
             <a:endParaRPr lang="en-US"/>
           </a:p>
@@ -5545,7 +5545,7 @@
           <a:p>
             <a:fld id="{FAFDAFBD-AA74-4F39-B34D-B8A0CE5CD8B0}" type="datetimeFigureOut">
               <a:rPr lang="en-US" smtClean="0"/>
-              <a:t>8/17/2023</a:t>
+              <a:t>8/18/2023</a:t>
             </a:fld>
             <a:endParaRPr lang="en-US"/>
           </a:p>
@@ -5919,7 +5919,7 @@
           <a:p>
             <a:fld id="{FAFDAFBD-AA74-4F39-B34D-B8A0CE5CD8B0}" type="datetimeFigureOut">
               <a:rPr lang="en-US" smtClean="0"/>
-              <a:t>8/17/2023</a:t>
+              <a:t>8/18/2023</a:t>
             </a:fld>
             <a:endParaRPr lang="en-US"/>
           </a:p>
@@ -6042,7 +6042,7 @@
           <a:p>
             <a:fld id="{FAFDAFBD-AA74-4F39-B34D-B8A0CE5CD8B0}" type="datetimeFigureOut">
               <a:rPr lang="en-US" smtClean="0"/>
-              <a:t>8/17/2023</a:t>
+              <a:t>8/18/2023</a:t>
             </a:fld>
             <a:endParaRPr lang="en-US"/>
           </a:p>
@@ -6137,7 +6137,7 @@
           <a:p>
             <a:fld id="{FAFDAFBD-AA74-4F39-B34D-B8A0CE5CD8B0}" type="datetimeFigureOut">
               <a:rPr lang="en-US" smtClean="0"/>
-              <a:t>8/17/2023</a:t>
+              <a:t>8/18/2023</a:t>
             </a:fld>
             <a:endParaRPr lang="en-US"/>
           </a:p>
@@ -6392,7 +6392,7 @@
           <a:p>
             <a:fld id="{FAFDAFBD-AA74-4F39-B34D-B8A0CE5CD8B0}" type="datetimeFigureOut">
               <a:rPr lang="en-US" smtClean="0"/>
-              <a:t>8/17/2023</a:t>
+              <a:t>8/18/2023</a:t>
             </a:fld>
             <a:endParaRPr lang="en-US"/>
           </a:p>
@@ -6578,7 +6578,7 @@
           <a:p>
             <a:fld id="{FAFDAFBD-AA74-4F39-B34D-B8A0CE5CD8B0}" type="datetimeFigureOut">
               <a:rPr lang="en-US" smtClean="0"/>
-              <a:t>8/17/2023</a:t>
+              <a:t>8/18/2023</a:t>
             </a:fld>
             <a:endParaRPr lang="en-US"/>
           </a:p>
@@ -6853,7 +6853,7 @@
           <a:p>
             <a:fld id="{FAFDAFBD-AA74-4F39-B34D-B8A0CE5CD8B0}" type="datetimeFigureOut">
               <a:rPr lang="en-US" smtClean="0"/>
-              <a:t>8/17/2023</a:t>
+              <a:t>8/18/2023</a:t>
             </a:fld>
             <a:endParaRPr lang="en-US"/>
           </a:p>
@@ -7104,7 +7104,7 @@
           <a:p>
             <a:fld id="{FAFDAFBD-AA74-4F39-B34D-B8A0CE5CD8B0}" type="datetimeFigureOut">
               <a:rPr lang="en-US" smtClean="0"/>
-              <a:t>8/17/2023</a:t>
+              <a:t>8/18/2023</a:t>
             </a:fld>
             <a:endParaRPr lang="en-US"/>
           </a:p>
@@ -7418,7 +7418,7 @@
           <a:p>
             <a:fld id="{FAFDAFBD-AA74-4F39-B34D-B8A0CE5CD8B0}" type="datetimeFigureOut">
               <a:rPr lang="en-US" smtClean="0"/>
-              <a:t>8/17/2023</a:t>
+              <a:t>8/18/2023</a:t>
             </a:fld>
             <a:endParaRPr lang="en-US"/>
           </a:p>
@@ -7759,7 +7759,7 @@
           <a:p>
             <a:fld id="{FAFDAFBD-AA74-4F39-B34D-B8A0CE5CD8B0}" type="datetimeFigureOut">
               <a:rPr lang="en-US" smtClean="0"/>
-              <a:t>8/17/2023</a:t>
+              <a:t>8/18/2023</a:t>
             </a:fld>
             <a:endParaRPr lang="en-US"/>
           </a:p>
@@ -8073,7 +8073,7 @@
           <a:p>
             <a:fld id="{FAFDAFBD-AA74-4F39-B34D-B8A0CE5CD8B0}" type="datetimeFigureOut">
               <a:rPr lang="en-US" smtClean="0"/>
-              <a:t>8/17/2023</a:t>
+              <a:t>8/18/2023</a:t>
             </a:fld>
             <a:endParaRPr lang="en-US"/>
           </a:p>
@@ -8466,7 +8466,7 @@
           <a:p>
             <a:fld id="{FAFDAFBD-AA74-4F39-B34D-B8A0CE5CD8B0}" type="datetimeFigureOut">
               <a:rPr lang="en-US" smtClean="0"/>
-              <a:t>8/17/2023</a:t>
+              <a:t>8/18/2023</a:t>
             </a:fld>
             <a:endParaRPr lang="en-US"/>
           </a:p>
@@ -8636,7 +8636,7 @@
           <a:p>
             <a:fld id="{FAFDAFBD-AA74-4F39-B34D-B8A0CE5CD8B0}" type="datetimeFigureOut">
               <a:rPr lang="en-US" smtClean="0"/>
-              <a:t>8/17/2023</a:t>
+              <a:t>8/18/2023</a:t>
             </a:fld>
             <a:endParaRPr lang="en-US"/>
           </a:p>
@@ -8816,7 +8816,7 @@
           <a:p>
             <a:fld id="{FAFDAFBD-AA74-4F39-B34D-B8A0CE5CD8B0}" type="datetimeFigureOut">
               <a:rPr lang="en-US" smtClean="0"/>
-              <a:t>8/17/2023</a:t>
+              <a:t>8/18/2023</a:t>
             </a:fld>
             <a:endParaRPr lang="en-US"/>
           </a:p>
@@ -9079,7 +9079,7 @@
           <a:p>
             <a:fld id="{FAFDAFBD-AA74-4F39-B34D-B8A0CE5CD8B0}" type="datetimeFigureOut">
               <a:rPr lang="en-US" smtClean="0"/>
-              <a:t>8/17/2023</a:t>
+              <a:t>8/18/2023</a:t>
             </a:fld>
             <a:endParaRPr lang="en-US"/>
           </a:p>
@@ -9344,7 +9344,7 @@
           <a:p>
             <a:fld id="{FAFDAFBD-AA74-4F39-B34D-B8A0CE5CD8B0}" type="datetimeFigureOut">
               <a:rPr lang="en-US" smtClean="0"/>
-              <a:t>8/17/2023</a:t>
+              <a:t>8/18/2023</a:t>
             </a:fld>
             <a:endParaRPr lang="en-US"/>
           </a:p>
@@ -9756,7 +9756,7 @@
           <a:p>
             <a:fld id="{FAFDAFBD-AA74-4F39-B34D-B8A0CE5CD8B0}" type="datetimeFigureOut">
               <a:rPr lang="en-US" smtClean="0"/>
-              <a:t>8/17/2023</a:t>
+              <a:t>8/18/2023</a:t>
             </a:fld>
             <a:endParaRPr lang="en-US"/>
           </a:p>
@@ -9897,7 +9897,7 @@
           <a:p>
             <a:fld id="{FAFDAFBD-AA74-4F39-B34D-B8A0CE5CD8B0}" type="datetimeFigureOut">
               <a:rPr lang="en-US" smtClean="0"/>
-              <a:t>8/17/2023</a:t>
+              <a:t>8/18/2023</a:t>
             </a:fld>
             <a:endParaRPr lang="en-US"/>
           </a:p>
@@ -10010,7 +10010,7 @@
           <a:p>
             <a:fld id="{FAFDAFBD-AA74-4F39-B34D-B8A0CE5CD8B0}" type="datetimeFigureOut">
               <a:rPr lang="en-US" smtClean="0"/>
-              <a:t>8/17/2023</a:t>
+              <a:t>8/18/2023</a:t>
             </a:fld>
             <a:endParaRPr lang="en-US"/>
           </a:p>
@@ -10321,7 +10321,7 @@
           <a:p>
             <a:fld id="{FAFDAFBD-AA74-4F39-B34D-B8A0CE5CD8B0}" type="datetimeFigureOut">
               <a:rPr lang="en-US" smtClean="0"/>
-              <a:t>8/17/2023</a:t>
+              <a:t>8/18/2023</a:t>
             </a:fld>
             <a:endParaRPr lang="en-US"/>
           </a:p>
@@ -10609,7 +10609,7 @@
           <a:p>
             <a:fld id="{FAFDAFBD-AA74-4F39-B34D-B8A0CE5CD8B0}" type="datetimeFigureOut">
               <a:rPr lang="en-US" smtClean="0"/>
-              <a:t>8/17/2023</a:t>
+              <a:t>8/18/2023</a:t>
             </a:fld>
             <a:endParaRPr lang="en-US"/>
           </a:p>
@@ -10850,7 +10850,7 @@
           <a:p>
             <a:fld id="{FAFDAFBD-AA74-4F39-B34D-B8A0CE5CD8B0}" type="datetimeFigureOut">
               <a:rPr lang="en-US" smtClean="0"/>
-              <a:t>8/17/2023</a:t>
+              <a:t>8/18/2023</a:t>
             </a:fld>
             <a:endParaRPr lang="en-US"/>
           </a:p>
@@ -11932,7 +11932,7 @@
           <a:p>
             <a:fld id="{FAFDAFBD-AA74-4F39-B34D-B8A0CE5CD8B0}" type="datetimeFigureOut">
               <a:rPr lang="en-US" smtClean="0"/>
-              <a:t>8/17/2023</a:t>
+              <a:t>8/18/2023</a:t>
             </a:fld>
             <a:endParaRPr lang="en-US"/>
           </a:p>
@@ -15657,7 +15657,7 @@
           <a:p>
             <a:r>
               <a:rPr lang="en-US" dirty="0"/>
-              <a:t>Life with UDDTs</a:t>
+              <a:t>Life with UDTTs</a:t>
             </a:r>
           </a:p>
         </p:txBody>
@@ -26696,7 +26696,7 @@
           <a:p>
             <a:r>
               <a:rPr lang="en-US" dirty="0"/>
-              <a:t>Performance-tuning a UDDT</a:t>
+              <a:t>Performance-tuning a UDTT</a:t>
             </a:r>
           </a:p>
         </p:txBody>
@@ -27102,7 +27102,7 @@
           <a:p>
             <a:r>
               <a:rPr lang="en-US" dirty="0"/>
-              <a:t>Performance-tuning a UDDT (steps)</a:t>
+              <a:t>Performance-tuning a UDTT (steps)</a:t>
             </a:r>
           </a:p>
         </p:txBody>
@@ -27903,7 +27903,7 @@
           <a:p>
             <a:r>
               <a:rPr lang="en-US" dirty="0"/>
-              <a:t>Performance-tuning a UDDT (steps)</a:t>
+              <a:t>Performance-tuning a UDTT (steps)</a:t>
             </a:r>
           </a:p>
         </p:txBody>
@@ -28589,7 +28589,7 @@
           <a:p>
             <a:r>
               <a:rPr lang="en-US" dirty="0"/>
-              <a:t>Performance-tuning a UDDT (steps)</a:t>
+              <a:t>Performance-tuning a UDTT (steps)</a:t>
             </a:r>
           </a:p>
         </p:txBody>
@@ -29387,7 +29387,7 @@
           <a:p>
             <a:r>
               <a:rPr lang="en-US" dirty="0"/>
-              <a:t>Performance-tuning a UDDT (steps)</a:t>
+              <a:t>Performance-tuning a UDTT (steps)</a:t>
             </a:r>
           </a:p>
         </p:txBody>
@@ -30106,7 +30106,7 @@
           <a:p>
             <a:r>
               <a:rPr lang="en-US" dirty="0"/>
-              <a:t>Performance-tuning a UDDT (steps)</a:t>
+              <a:t>Performance-tuning a UDTT (steps)</a:t>
             </a:r>
           </a:p>
         </p:txBody>
@@ -30555,7 +30555,7 @@
           <a:p>
             <a:r>
               <a:rPr lang="en-US" dirty="0"/>
-              <a:t>Performance-tuning a UDDT (steps)</a:t>
+              <a:t>Performance-tuning a UDTT (steps)</a:t>
             </a:r>
           </a:p>
         </p:txBody>
@@ -30947,7 +30947,7 @@
           <a:p>
             <a:r>
               <a:rPr lang="en-US" dirty="0"/>
-              <a:t>Performance-tuning a UDDT (steps)</a:t>
+              <a:t>Performance-tuning a UDTT (steps)</a:t>
             </a:r>
           </a:p>
         </p:txBody>
@@ -31623,7 +31623,7 @@
           <a:p>
             <a:r>
               <a:rPr lang="en-US" dirty="0"/>
-              <a:t>Performance-tuning a UDDT</a:t>
+              <a:t>Performance-tuning a UDTT</a:t>
             </a:r>
           </a:p>
         </p:txBody>
@@ -33077,7 +33077,15 @@
           <a:p>
             <a:r>
               <a:rPr lang="en-US" sz="2400" dirty="0"/>
-              <a:t>I learned a lot about UDDTs, but I will continue to do things the way I currently insert data</a:t>
+              <a:t>I learned a lot </a:t>
+            </a:r>
+            <a:r>
+              <a:rPr lang="en-US" sz="2400"/>
+              <a:t>about UDTTs</a:t>
+            </a:r>
+            <a:r>
+              <a:rPr lang="en-US" sz="2400" dirty="0"/>
+              <a:t>, but I will continue to do things the way I currently insert data</a:t>
             </a:r>
           </a:p>
           <a:p>
@@ -33224,7 +33232,7 @@
           <a:p>
             <a:r>
               <a:rPr lang="en-US" dirty="0"/>
-              <a:t>Life without UDDTs – Row-by-Agonizing-Row</a:t>
+              <a:t>Life without UDTTs – Row-by-Agonizing-Row</a:t>
             </a:r>
           </a:p>
         </p:txBody>

</xml_diff>

<commit_message>
changes after Philly Code Camp
</commit_message>
<xml_diff>
--- a/Datatables_and_Dataframes_to_SQL_Procs/User-defined Table Types.pptx
+++ b/Datatables_and_Dataframes_to_SQL_Procs/User-defined Table Types.pptx
@@ -6,7 +6,7 @@
     <p:sldMasterId id="2147483689" r:id="rId2"/>
   </p:sldMasterIdLst>
   <p:notesMasterIdLst>
-    <p:notesMasterId r:id="rId43"/>
+    <p:notesMasterId r:id="rId44"/>
   </p:notesMasterIdLst>
   <p:sldIdLst>
     <p:sldId id="256" r:id="rId3"/>
@@ -49,6 +49,7 @@
     <p:sldId id="296" r:id="rId40"/>
     <p:sldId id="300" r:id="rId41"/>
     <p:sldId id="305" r:id="rId42"/>
+    <p:sldId id="318" r:id="rId43"/>
   </p:sldIdLst>
   <p:sldSz cx="12192000" cy="6858000"/>
   <p:notesSz cx="6858000" cy="9144000"/>
@@ -249,7 +250,7 @@
           <a:p>
             <a:fld id="{3E17F473-D930-40CF-A164-F39E2E601F13}" type="datetimeFigureOut">
               <a:rPr lang="en-US" smtClean="0"/>
-              <a:t>10/13/2023</a:t>
+              <a:t>10/14/2023</a:t>
             </a:fld>
             <a:endParaRPr lang="en-US"/>
           </a:p>
@@ -3775,7 +3776,7 @@
           <a:p>
             <a:fld id="{FAFDAFBD-AA74-4F39-B34D-B8A0CE5CD8B0}" type="datetimeFigureOut">
               <a:rPr lang="en-US" smtClean="0"/>
-              <a:t>10/13/2023</a:t>
+              <a:t>10/14/2023</a:t>
             </a:fld>
             <a:endParaRPr lang="en-US"/>
           </a:p>
@@ -3973,7 +3974,7 @@
           <a:p>
             <a:fld id="{FAFDAFBD-AA74-4F39-B34D-B8A0CE5CD8B0}" type="datetimeFigureOut">
               <a:rPr lang="en-US" smtClean="0"/>
-              <a:t>10/13/2023</a:t>
+              <a:t>10/14/2023</a:t>
             </a:fld>
             <a:endParaRPr lang="en-US"/>
           </a:p>
@@ -4181,7 +4182,7 @@
           <a:p>
             <a:fld id="{FAFDAFBD-AA74-4F39-B34D-B8A0CE5CD8B0}" type="datetimeFigureOut">
               <a:rPr lang="en-US" smtClean="0"/>
-              <a:t>10/13/2023</a:t>
+              <a:t>10/14/2023</a:t>
             </a:fld>
             <a:endParaRPr lang="en-US"/>
           </a:p>
@@ -4976,7 +4977,7 @@
           <a:p>
             <a:fld id="{FAFDAFBD-AA74-4F39-B34D-B8A0CE5CD8B0}" type="datetimeFigureOut">
               <a:rPr lang="en-US" smtClean="0"/>
-              <a:t>10/13/2023</a:t>
+              <a:t>10/14/2023</a:t>
             </a:fld>
             <a:endParaRPr lang="en-US"/>
           </a:p>
@@ -5152,7 +5153,7 @@
           <a:p>
             <a:fld id="{FAFDAFBD-AA74-4F39-B34D-B8A0CE5CD8B0}" type="datetimeFigureOut">
               <a:rPr lang="en-US" smtClean="0"/>
-              <a:t>10/13/2023</a:t>
+              <a:t>10/14/2023</a:t>
             </a:fld>
             <a:endParaRPr lang="en-US"/>
           </a:p>
@@ -5399,7 +5400,7 @@
           <a:p>
             <a:fld id="{FAFDAFBD-AA74-4F39-B34D-B8A0CE5CD8B0}" type="datetimeFigureOut">
               <a:rPr lang="en-US" smtClean="0"/>
-              <a:t>10/13/2023</a:t>
+              <a:t>10/14/2023</a:t>
             </a:fld>
             <a:endParaRPr lang="en-US"/>
           </a:p>
@@ -5631,7 +5632,7 @@
           <a:p>
             <a:fld id="{FAFDAFBD-AA74-4F39-B34D-B8A0CE5CD8B0}" type="datetimeFigureOut">
               <a:rPr lang="en-US" smtClean="0"/>
-              <a:t>10/13/2023</a:t>
+              <a:t>10/14/2023</a:t>
             </a:fld>
             <a:endParaRPr lang="en-US"/>
           </a:p>
@@ -6005,7 +6006,7 @@
           <a:p>
             <a:fld id="{FAFDAFBD-AA74-4F39-B34D-B8A0CE5CD8B0}" type="datetimeFigureOut">
               <a:rPr lang="en-US" smtClean="0"/>
-              <a:t>10/13/2023</a:t>
+              <a:t>10/14/2023</a:t>
             </a:fld>
             <a:endParaRPr lang="en-US"/>
           </a:p>
@@ -6128,7 +6129,7 @@
           <a:p>
             <a:fld id="{FAFDAFBD-AA74-4F39-B34D-B8A0CE5CD8B0}" type="datetimeFigureOut">
               <a:rPr lang="en-US" smtClean="0"/>
-              <a:t>10/13/2023</a:t>
+              <a:t>10/14/2023</a:t>
             </a:fld>
             <a:endParaRPr lang="en-US"/>
           </a:p>
@@ -6223,7 +6224,7 @@
           <a:p>
             <a:fld id="{FAFDAFBD-AA74-4F39-B34D-B8A0CE5CD8B0}" type="datetimeFigureOut">
               <a:rPr lang="en-US" smtClean="0"/>
-              <a:t>10/13/2023</a:t>
+              <a:t>10/14/2023</a:t>
             </a:fld>
             <a:endParaRPr lang="en-US"/>
           </a:p>
@@ -6478,7 +6479,7 @@
           <a:p>
             <a:fld id="{FAFDAFBD-AA74-4F39-B34D-B8A0CE5CD8B0}" type="datetimeFigureOut">
               <a:rPr lang="en-US" smtClean="0"/>
-              <a:t>10/13/2023</a:t>
+              <a:t>10/14/2023</a:t>
             </a:fld>
             <a:endParaRPr lang="en-US"/>
           </a:p>
@@ -6664,7 +6665,7 @@
           <a:p>
             <a:fld id="{FAFDAFBD-AA74-4F39-B34D-B8A0CE5CD8B0}" type="datetimeFigureOut">
               <a:rPr lang="en-US" smtClean="0"/>
-              <a:t>10/13/2023</a:t>
+              <a:t>10/14/2023</a:t>
             </a:fld>
             <a:endParaRPr lang="en-US"/>
           </a:p>
@@ -6939,7 +6940,7 @@
           <a:p>
             <a:fld id="{FAFDAFBD-AA74-4F39-B34D-B8A0CE5CD8B0}" type="datetimeFigureOut">
               <a:rPr lang="en-US" smtClean="0"/>
-              <a:t>10/13/2023</a:t>
+              <a:t>10/14/2023</a:t>
             </a:fld>
             <a:endParaRPr lang="en-US"/>
           </a:p>
@@ -7190,7 +7191,7 @@
           <a:p>
             <a:fld id="{FAFDAFBD-AA74-4F39-B34D-B8A0CE5CD8B0}" type="datetimeFigureOut">
               <a:rPr lang="en-US" smtClean="0"/>
-              <a:t>10/13/2023</a:t>
+              <a:t>10/14/2023</a:t>
             </a:fld>
             <a:endParaRPr lang="en-US"/>
           </a:p>
@@ -7504,7 +7505,7 @@
           <a:p>
             <a:fld id="{FAFDAFBD-AA74-4F39-B34D-B8A0CE5CD8B0}" type="datetimeFigureOut">
               <a:rPr lang="en-US" smtClean="0"/>
-              <a:t>10/13/2023</a:t>
+              <a:t>10/14/2023</a:t>
             </a:fld>
             <a:endParaRPr lang="en-US"/>
           </a:p>
@@ -7845,7 +7846,7 @@
           <a:p>
             <a:fld id="{FAFDAFBD-AA74-4F39-B34D-B8A0CE5CD8B0}" type="datetimeFigureOut">
               <a:rPr lang="en-US" smtClean="0"/>
-              <a:t>10/13/2023</a:t>
+              <a:t>10/14/2023</a:t>
             </a:fld>
             <a:endParaRPr lang="en-US"/>
           </a:p>
@@ -8159,7 +8160,7 @@
           <a:p>
             <a:fld id="{FAFDAFBD-AA74-4F39-B34D-B8A0CE5CD8B0}" type="datetimeFigureOut">
               <a:rPr lang="en-US" smtClean="0"/>
-              <a:t>10/13/2023</a:t>
+              <a:t>10/14/2023</a:t>
             </a:fld>
             <a:endParaRPr lang="en-US"/>
           </a:p>
@@ -8552,7 +8553,7 @@
           <a:p>
             <a:fld id="{FAFDAFBD-AA74-4F39-B34D-B8A0CE5CD8B0}" type="datetimeFigureOut">
               <a:rPr lang="en-US" smtClean="0"/>
-              <a:t>10/13/2023</a:t>
+              <a:t>10/14/2023</a:t>
             </a:fld>
             <a:endParaRPr lang="en-US"/>
           </a:p>
@@ -8722,7 +8723,7 @@
           <a:p>
             <a:fld id="{FAFDAFBD-AA74-4F39-B34D-B8A0CE5CD8B0}" type="datetimeFigureOut">
               <a:rPr lang="en-US" smtClean="0"/>
-              <a:t>10/13/2023</a:t>
+              <a:t>10/14/2023</a:t>
             </a:fld>
             <a:endParaRPr lang="en-US"/>
           </a:p>
@@ -8902,7 +8903,7 @@
           <a:p>
             <a:fld id="{FAFDAFBD-AA74-4F39-B34D-B8A0CE5CD8B0}" type="datetimeFigureOut">
               <a:rPr lang="en-US" smtClean="0"/>
-              <a:t>10/13/2023</a:t>
+              <a:t>10/14/2023</a:t>
             </a:fld>
             <a:endParaRPr lang="en-US"/>
           </a:p>
@@ -9165,7 +9166,7 @@
           <a:p>
             <a:fld id="{FAFDAFBD-AA74-4F39-B34D-B8A0CE5CD8B0}" type="datetimeFigureOut">
               <a:rPr lang="en-US" smtClean="0"/>
-              <a:t>10/13/2023</a:t>
+              <a:t>10/14/2023</a:t>
             </a:fld>
             <a:endParaRPr lang="en-US"/>
           </a:p>
@@ -9430,7 +9431,7 @@
           <a:p>
             <a:fld id="{FAFDAFBD-AA74-4F39-B34D-B8A0CE5CD8B0}" type="datetimeFigureOut">
               <a:rPr lang="en-US" smtClean="0"/>
-              <a:t>10/13/2023</a:t>
+              <a:t>10/14/2023</a:t>
             </a:fld>
             <a:endParaRPr lang="en-US"/>
           </a:p>
@@ -9842,7 +9843,7 @@
           <a:p>
             <a:fld id="{FAFDAFBD-AA74-4F39-B34D-B8A0CE5CD8B0}" type="datetimeFigureOut">
               <a:rPr lang="en-US" smtClean="0"/>
-              <a:t>10/13/2023</a:t>
+              <a:t>10/14/2023</a:t>
             </a:fld>
             <a:endParaRPr lang="en-US"/>
           </a:p>
@@ -9983,7 +9984,7 @@
           <a:p>
             <a:fld id="{FAFDAFBD-AA74-4F39-B34D-B8A0CE5CD8B0}" type="datetimeFigureOut">
               <a:rPr lang="en-US" smtClean="0"/>
-              <a:t>10/13/2023</a:t>
+              <a:t>10/14/2023</a:t>
             </a:fld>
             <a:endParaRPr lang="en-US"/>
           </a:p>
@@ -10096,7 +10097,7 @@
           <a:p>
             <a:fld id="{FAFDAFBD-AA74-4F39-B34D-B8A0CE5CD8B0}" type="datetimeFigureOut">
               <a:rPr lang="en-US" smtClean="0"/>
-              <a:t>10/13/2023</a:t>
+              <a:t>10/14/2023</a:t>
             </a:fld>
             <a:endParaRPr lang="en-US"/>
           </a:p>
@@ -10407,7 +10408,7 @@
           <a:p>
             <a:fld id="{FAFDAFBD-AA74-4F39-B34D-B8A0CE5CD8B0}" type="datetimeFigureOut">
               <a:rPr lang="en-US" smtClean="0"/>
-              <a:t>10/13/2023</a:t>
+              <a:t>10/14/2023</a:t>
             </a:fld>
             <a:endParaRPr lang="en-US"/>
           </a:p>
@@ -10695,7 +10696,7 @@
           <a:p>
             <a:fld id="{FAFDAFBD-AA74-4F39-B34D-B8A0CE5CD8B0}" type="datetimeFigureOut">
               <a:rPr lang="en-US" smtClean="0"/>
-              <a:t>10/13/2023</a:t>
+              <a:t>10/14/2023</a:t>
             </a:fld>
             <a:endParaRPr lang="en-US"/>
           </a:p>
@@ -10936,7 +10937,7 @@
           <a:p>
             <a:fld id="{FAFDAFBD-AA74-4F39-B34D-B8A0CE5CD8B0}" type="datetimeFigureOut">
               <a:rPr lang="en-US" smtClean="0"/>
-              <a:t>10/13/2023</a:t>
+              <a:t>10/14/2023</a:t>
             </a:fld>
             <a:endParaRPr lang="en-US"/>
           </a:p>
@@ -12018,7 +12019,7 @@
           <a:p>
             <a:fld id="{FAFDAFBD-AA74-4F39-B34D-B8A0CE5CD8B0}" type="datetimeFigureOut">
               <a:rPr lang="en-US" smtClean="0"/>
-              <a:t>10/13/2023</a:t>
+              <a:t>10/14/2023</a:t>
             </a:fld>
             <a:endParaRPr lang="en-US"/>
           </a:p>
@@ -23466,6 +23467,368 @@
     <p:extLst>
       <p:ext uri="{BB962C8B-B14F-4D97-AF65-F5344CB8AC3E}">
         <p14:creationId xmlns:p14="http://schemas.microsoft.com/office/powerpoint/2010/main" val="3447437733"/>
+      </p:ext>
+    </p:extLst>
+  </p:cSld>
+  <p:clrMapOvr>
+    <a:masterClrMapping/>
+  </p:clrMapOvr>
+</p:sld>
+</file>
+
+<file path=ppt/slides/slide41.xml><?xml version="1.0" encoding="utf-8"?>
+<p:sld xmlns:a="http://schemas.openxmlformats.org/drawingml/2006/main" xmlns:r="http://schemas.openxmlformats.org/officeDocument/2006/relationships" xmlns:p="http://schemas.openxmlformats.org/presentationml/2006/main">
+  <p:cSld>
+    <p:spTree>
+      <p:nvGrpSpPr>
+        <p:cNvPr id="1" name=""/>
+        <p:cNvGrpSpPr/>
+        <p:nvPr/>
+      </p:nvGrpSpPr>
+      <p:grpSpPr>
+        <a:xfrm>
+          <a:off x="0" y="0"/>
+          <a:ext cx="0" cy="0"/>
+          <a:chOff x="0" y="0"/>
+          <a:chExt cx="0" cy="0"/>
+        </a:xfrm>
+      </p:grpSpPr>
+      <p:sp>
+        <p:nvSpPr>
+          <p:cNvPr id="3" name="TextBox 2">
+            <a:extLst>
+              <a:ext uri="{FF2B5EF4-FFF2-40B4-BE49-F238E27FC236}">
+                <a16:creationId xmlns:a16="http://schemas.microsoft.com/office/drawing/2014/main" id="{0460B561-9B3E-A968-2B4E-7319150C79C4}"/>
+              </a:ext>
+            </a:extLst>
+          </p:cNvPr>
+          <p:cNvSpPr txBox="1"/>
+          <p:nvPr/>
+        </p:nvSpPr>
+        <p:spPr>
+          <a:xfrm>
+            <a:off x="1510146" y="5437227"/>
+            <a:ext cx="6802581" cy="400110"/>
+          </a:xfrm>
+          <a:prstGeom prst="rect">
+            <a:avLst/>
+          </a:prstGeom>
+          <a:noFill/>
+        </p:spPr>
+        <p:txBody>
+          <a:bodyPr wrap="square">
+            <a:spAutoFit/>
+          </a:bodyPr>
+          <a:lstStyle/>
+          <a:p>
+            <a:r>
+              <a:rPr lang="en-US" sz="2000">
+                <a:latin typeface="Verdana" panose="020B0604030504040204" pitchFamily="34" charset="0"/>
+                <a:ea typeface="Verdana" panose="020B0604030504040204" pitchFamily="34" charset="0"/>
+              </a:rPr>
+              <a:t>https://github.com/jbfoushee/MyPresentations/</a:t>
+            </a:r>
+            <a:endParaRPr lang="en-US" sz="2000" dirty="0">
+              <a:latin typeface="Verdana" panose="020B0604030504040204" pitchFamily="34" charset="0"/>
+              <a:ea typeface="Verdana" panose="020B0604030504040204" pitchFamily="34" charset="0"/>
+            </a:endParaRPr>
+          </a:p>
+        </p:txBody>
+      </p:sp>
+      <p:sp>
+        <p:nvSpPr>
+          <p:cNvPr id="5" name="TextBox 4">
+            <a:extLst>
+              <a:ext uri="{FF2B5EF4-FFF2-40B4-BE49-F238E27FC236}">
+                <a16:creationId xmlns:a16="http://schemas.microsoft.com/office/drawing/2014/main" id="{ABF7E1BF-9545-970E-5C17-B09523F51437}"/>
+              </a:ext>
+            </a:extLst>
+          </p:cNvPr>
+          <p:cNvSpPr txBox="1"/>
+          <p:nvPr/>
+        </p:nvSpPr>
+        <p:spPr>
+          <a:xfrm>
+            <a:off x="1510146" y="4895212"/>
+            <a:ext cx="7439890" cy="400110"/>
+          </a:xfrm>
+          <a:prstGeom prst="rect">
+            <a:avLst/>
+          </a:prstGeom>
+          <a:noFill/>
+        </p:spPr>
+        <p:txBody>
+          <a:bodyPr wrap="square">
+            <a:spAutoFit/>
+          </a:bodyPr>
+          <a:lstStyle/>
+          <a:p>
+            <a:r>
+              <a:rPr lang="en-US" sz="2000" dirty="0">
+                <a:latin typeface="Verdana" panose="020B0604030504040204" pitchFamily="34" charset="0"/>
+                <a:ea typeface="Verdana" panose="020B0604030504040204" pitchFamily="34" charset="0"/>
+              </a:rPr>
+              <a:t>https://www.linkedin.com/in/jeff-foushee-13b80a100/</a:t>
+            </a:r>
+          </a:p>
+        </p:txBody>
+      </p:sp>
+      <p:pic>
+        <p:nvPicPr>
+          <p:cNvPr id="1026" name="Picture 2" descr="Linkedin-logo | myCloudDoor - Expertise for Cloud Transition">
+            <a:extLst>
+              <a:ext uri="{FF2B5EF4-FFF2-40B4-BE49-F238E27FC236}">
+                <a16:creationId xmlns:a16="http://schemas.microsoft.com/office/drawing/2014/main" id="{7541C2E9-3409-6A8C-14FE-E2F786407B3E}"/>
+              </a:ext>
+            </a:extLst>
+          </p:cNvPr>
+          <p:cNvPicPr>
+            <a:picLocks noChangeAspect="1" noChangeArrowheads="1"/>
+          </p:cNvPicPr>
+          <p:nvPr/>
+        </p:nvPicPr>
+        <p:blipFill>
+          <a:blip r:embed="rId2">
+            <a:extLst>
+              <a:ext uri="{28A0092B-C50C-407E-A947-70E740481C1C}">
+                <a14:useLocalDpi xmlns:a14="http://schemas.microsoft.com/office/drawing/2010/main" val="0"/>
+              </a:ext>
+            </a:extLst>
+          </a:blip>
+          <a:srcRect/>
+          <a:stretch>
+            <a:fillRect/>
+          </a:stretch>
+        </p:blipFill>
+        <p:spPr bwMode="auto">
+          <a:xfrm>
+            <a:off x="831273" y="4897215"/>
+            <a:ext cx="678873" cy="381866"/>
+          </a:xfrm>
+          <a:prstGeom prst="rect">
+            <a:avLst/>
+          </a:prstGeom>
+          <a:noFill/>
+          <a:extLst>
+            <a:ext uri="{909E8E84-426E-40DD-AFC4-6F175D3DCCD1}">
+              <a14:hiddenFill xmlns:a14="http://schemas.microsoft.com/office/drawing/2010/main">
+                <a:solidFill>
+                  <a:srgbClr val="FFFFFF"/>
+                </a:solidFill>
+              </a14:hiddenFill>
+            </a:ext>
+          </a:extLst>
+        </p:spPr>
+      </p:pic>
+      <p:pic>
+        <p:nvPicPr>
+          <p:cNvPr id="1028" name="Picture 4" descr="GitHub Logo, symbol, meaning, history, PNG, brand">
+            <a:extLst>
+              <a:ext uri="{FF2B5EF4-FFF2-40B4-BE49-F238E27FC236}">
+                <a16:creationId xmlns:a16="http://schemas.microsoft.com/office/drawing/2014/main" id="{4A4A3218-5674-2C67-8D76-BCC0445E30D3}"/>
+              </a:ext>
+            </a:extLst>
+          </p:cNvPr>
+          <p:cNvPicPr>
+            <a:picLocks noChangeAspect="1" noChangeArrowheads="1"/>
+          </p:cNvPicPr>
+          <p:nvPr/>
+        </p:nvPicPr>
+        <p:blipFill>
+          <a:blip r:embed="rId3">
+            <a:extLst>
+              <a:ext uri="{28A0092B-C50C-407E-A947-70E740481C1C}">
+                <a14:useLocalDpi xmlns:a14="http://schemas.microsoft.com/office/drawing/2010/main" val="0"/>
+              </a:ext>
+            </a:extLst>
+          </a:blip>
+          <a:srcRect/>
+          <a:stretch>
+            <a:fillRect/>
+          </a:stretch>
+        </p:blipFill>
+        <p:spPr bwMode="auto">
+          <a:xfrm>
+            <a:off x="831272" y="5451764"/>
+            <a:ext cx="678874" cy="381867"/>
+          </a:xfrm>
+          <a:prstGeom prst="rect">
+            <a:avLst/>
+          </a:prstGeom>
+          <a:noFill/>
+          <a:extLst>
+            <a:ext uri="{909E8E84-426E-40DD-AFC4-6F175D3DCCD1}">
+              <a14:hiddenFill xmlns:a14="http://schemas.microsoft.com/office/drawing/2010/main">
+                <a:solidFill>
+                  <a:srgbClr val="FFFFFF"/>
+                </a:solidFill>
+              </a14:hiddenFill>
+            </a:ext>
+          </a:extLst>
+        </p:spPr>
+      </p:pic>
+      <p:pic>
+        <p:nvPicPr>
+          <p:cNvPr id="7" name="Picture 6">
+            <a:extLst>
+              <a:ext uri="{FF2B5EF4-FFF2-40B4-BE49-F238E27FC236}">
+                <a16:creationId xmlns:a16="http://schemas.microsoft.com/office/drawing/2014/main" id="{4EF63783-B000-A4BC-CCBD-ECC8D1236DD3}"/>
+              </a:ext>
+            </a:extLst>
+          </p:cNvPr>
+          <p:cNvPicPr>
+            <a:picLocks noChangeAspect="1"/>
+          </p:cNvPicPr>
+          <p:nvPr/>
+        </p:nvPicPr>
+        <p:blipFill>
+          <a:blip r:embed="rId4">
+            <a:extLst>
+              <a:ext uri="{28A0092B-C50C-407E-A947-70E740481C1C}">
+                <a14:useLocalDpi xmlns:a14="http://schemas.microsoft.com/office/drawing/2010/main" val="0"/>
+              </a:ext>
+            </a:extLst>
+          </a:blip>
+          <a:stretch>
+            <a:fillRect/>
+          </a:stretch>
+        </p:blipFill>
+        <p:spPr>
+          <a:xfrm>
+            <a:off x="1039090" y="1578919"/>
+            <a:ext cx="2228212" cy="2228212"/>
+          </a:xfrm>
+          <a:prstGeom prst="rect">
+            <a:avLst/>
+          </a:prstGeom>
+        </p:spPr>
+      </p:pic>
+      <p:sp>
+        <p:nvSpPr>
+          <p:cNvPr id="8" name="TextBox 7">
+            <a:extLst>
+              <a:ext uri="{FF2B5EF4-FFF2-40B4-BE49-F238E27FC236}">
+                <a16:creationId xmlns:a16="http://schemas.microsoft.com/office/drawing/2014/main" id="{98A32F5C-E514-95A5-9E67-696F9A1524ED}"/>
+              </a:ext>
+            </a:extLst>
+          </p:cNvPr>
+          <p:cNvSpPr txBox="1"/>
+          <p:nvPr/>
+        </p:nvSpPr>
+        <p:spPr>
+          <a:xfrm>
+            <a:off x="4225637" y="1020663"/>
+            <a:ext cx="6442363" cy="2985433"/>
+          </a:xfrm>
+          <a:prstGeom prst="rect">
+            <a:avLst/>
+          </a:prstGeom>
+          <a:noFill/>
+        </p:spPr>
+        <p:txBody>
+          <a:bodyPr wrap="square" rtlCol="0">
+            <a:spAutoFit/>
+          </a:bodyPr>
+          <a:lstStyle/>
+          <a:p>
+            <a:r>
+              <a:rPr lang="en-US" sz="3600" dirty="0">
+                <a:latin typeface="Verdana" panose="020B0604030504040204" pitchFamily="34" charset="0"/>
+                <a:ea typeface="Verdana" panose="020B0604030504040204" pitchFamily="34" charset="0"/>
+              </a:rPr>
+              <a:t>Jeff Foushee</a:t>
+            </a:r>
+          </a:p>
+          <a:p>
+            <a:endParaRPr lang="en-US" sz="2400" dirty="0">
+              <a:latin typeface="Verdana" panose="020B0604030504040204" pitchFamily="34" charset="0"/>
+              <a:ea typeface="Verdana" panose="020B0604030504040204" pitchFamily="34" charset="0"/>
+            </a:endParaRPr>
+          </a:p>
+          <a:p>
+            <a:pPr marL="285750" indent="-285750">
+              <a:buFont typeface="Arial" panose="020B0604020202020204" pitchFamily="34" charset="0"/>
+              <a:buChar char="•"/>
+            </a:pPr>
+            <a:r>
+              <a:rPr lang="en-US" sz="2400" dirty="0">
+                <a:latin typeface="Verdana" panose="020B0604030504040204" pitchFamily="34" charset="0"/>
+                <a:ea typeface="Verdana" panose="020B0604030504040204" pitchFamily="34" charset="0"/>
+              </a:rPr>
+              <a:t>SQL Server Database Admin</a:t>
+            </a:r>
+          </a:p>
+          <a:p>
+            <a:pPr marL="285750" indent="-285750">
+              <a:buFont typeface="Arial" panose="020B0604020202020204" pitchFamily="34" charset="0"/>
+              <a:buChar char="•"/>
+            </a:pPr>
+            <a:endParaRPr lang="en-US" sz="1000" dirty="0">
+              <a:latin typeface="Verdana" panose="020B0604030504040204" pitchFamily="34" charset="0"/>
+              <a:ea typeface="Verdana" panose="020B0604030504040204" pitchFamily="34" charset="0"/>
+            </a:endParaRPr>
+          </a:p>
+          <a:p>
+            <a:pPr marL="285750" indent="-285750">
+              <a:buFont typeface="Arial" panose="020B0604020202020204" pitchFamily="34" charset="0"/>
+              <a:buChar char="•"/>
+            </a:pPr>
+            <a:r>
+              <a:rPr lang="en-US" sz="2400" dirty="0">
+                <a:latin typeface="Verdana" panose="020B0604030504040204" pitchFamily="34" charset="0"/>
+                <a:ea typeface="Verdana" panose="020B0604030504040204" pitchFamily="34" charset="0"/>
+              </a:rPr>
+              <a:t>Programmer</a:t>
+            </a:r>
+          </a:p>
+          <a:p>
+            <a:endParaRPr lang="en-US" sz="1000" dirty="0">
+              <a:latin typeface="Verdana" panose="020B0604030504040204" pitchFamily="34" charset="0"/>
+              <a:ea typeface="Verdana" panose="020B0604030504040204" pitchFamily="34" charset="0"/>
+            </a:endParaRPr>
+          </a:p>
+          <a:p>
+            <a:pPr marL="285750" indent="-285750">
+              <a:buFont typeface="Arial" panose="020B0604020202020204" pitchFamily="34" charset="0"/>
+              <a:buChar char="•"/>
+            </a:pPr>
+            <a:r>
+              <a:rPr lang="en-US" sz="2400" dirty="0">
+                <a:latin typeface="Verdana" panose="020B0604030504040204" pitchFamily="34" charset="0"/>
+                <a:ea typeface="Verdana" panose="020B0604030504040204" pitchFamily="34" charset="0"/>
+              </a:rPr>
+              <a:t>SQL Saturday speaker</a:t>
+            </a:r>
+          </a:p>
+          <a:p>
+            <a:pPr marL="285750" indent="-285750">
+              <a:buFont typeface="Arial" panose="020B0604020202020204" pitchFamily="34" charset="0"/>
+              <a:buChar char="•"/>
+            </a:pPr>
+            <a:endParaRPr lang="en-US" sz="1200" dirty="0">
+              <a:latin typeface="Verdana" panose="020B0604030504040204" pitchFamily="34" charset="0"/>
+              <a:ea typeface="Verdana" panose="020B0604030504040204" pitchFamily="34" charset="0"/>
+            </a:endParaRPr>
+          </a:p>
+          <a:p>
+            <a:pPr marL="285750" indent="-285750">
+              <a:buFont typeface="Arial" panose="020B0604020202020204" pitchFamily="34" charset="0"/>
+              <a:buChar char="•"/>
+            </a:pPr>
+            <a:r>
+              <a:rPr lang="en-US" sz="2400" dirty="0">
+                <a:latin typeface="Verdana" panose="020B0604030504040204" pitchFamily="34" charset="0"/>
+                <a:ea typeface="Verdana" panose="020B0604030504040204" pitchFamily="34" charset="0"/>
+              </a:rPr>
+              <a:t>Blackjack dealer</a:t>
+            </a:r>
+          </a:p>
+        </p:txBody>
+      </p:sp>
+    </p:spTree>
+    <p:extLst>
+      <p:ext uri="{BB962C8B-B14F-4D97-AF65-F5344CB8AC3E}">
+        <p14:creationId xmlns:p14="http://schemas.microsoft.com/office/powerpoint/2010/main" val="3600115848"/>
       </p:ext>
     </p:extLst>
   </p:cSld>

</xml_diff>

<commit_message>
final updates for SQL Sat BR
</commit_message>
<xml_diff>
--- a/Datatables_and_Dataframes_to_SQL_Procs/User-defined Table Types.pptx
+++ b/Datatables_and_Dataframes_to_SQL_Procs/User-defined Table Types.pptx
@@ -13,7 +13,7 @@
     <p:sldId id="256" r:id="rId4"/>
     <p:sldId id="257" r:id="rId5"/>
     <p:sldId id="291" r:id="rId6"/>
-    <p:sldId id="314" r:id="rId7"/>
+    <p:sldId id="349" r:id="rId7"/>
     <p:sldId id="302" r:id="rId8"/>
     <p:sldId id="258" r:id="rId9"/>
     <p:sldId id="259" r:id="rId10"/>
@@ -251,7 +251,7 @@
           <a:p>
             <a:fld id="{3E17F473-D930-40CF-A164-F39E2E601F13}" type="datetimeFigureOut">
               <a:rPr lang="en-US" smtClean="0"/>
-              <a:t>5/10/2024</a:t>
+              <a:t>7/21/2024</a:t>
             </a:fld>
             <a:endParaRPr lang="en-US"/>
           </a:p>
@@ -3777,7 +3777,7 @@
           <a:p>
             <a:fld id="{FAFDAFBD-AA74-4F39-B34D-B8A0CE5CD8B0}" type="datetimeFigureOut">
               <a:rPr lang="en-US" smtClean="0"/>
-              <a:t>5/10/2024</a:t>
+              <a:t>7/21/2024</a:t>
             </a:fld>
             <a:endParaRPr lang="en-US"/>
           </a:p>
@@ -3975,7 +3975,7 @@
           <a:p>
             <a:fld id="{FAFDAFBD-AA74-4F39-B34D-B8A0CE5CD8B0}" type="datetimeFigureOut">
               <a:rPr lang="en-US" smtClean="0"/>
-              <a:t>5/10/2024</a:t>
+              <a:t>7/21/2024</a:t>
             </a:fld>
             <a:endParaRPr lang="en-US"/>
           </a:p>
@@ -4183,7 +4183,7 @@
           <a:p>
             <a:fld id="{FAFDAFBD-AA74-4F39-B34D-B8A0CE5CD8B0}" type="datetimeFigureOut">
               <a:rPr lang="en-US" smtClean="0"/>
-              <a:t>5/10/2024</a:t>
+              <a:t>7/21/2024</a:t>
             </a:fld>
             <a:endParaRPr lang="en-US"/>
           </a:p>
@@ -4978,7 +4978,7 @@
           <a:p>
             <a:fld id="{FAFDAFBD-AA74-4F39-B34D-B8A0CE5CD8B0}" type="datetimeFigureOut">
               <a:rPr lang="en-US" smtClean="0"/>
-              <a:t>5/10/2024</a:t>
+              <a:t>7/21/2024</a:t>
             </a:fld>
             <a:endParaRPr lang="en-US"/>
           </a:p>
@@ -5154,7 +5154,7 @@
           <a:p>
             <a:fld id="{FAFDAFBD-AA74-4F39-B34D-B8A0CE5CD8B0}" type="datetimeFigureOut">
               <a:rPr lang="en-US" smtClean="0"/>
-              <a:t>5/10/2024</a:t>
+              <a:t>7/21/2024</a:t>
             </a:fld>
             <a:endParaRPr lang="en-US"/>
           </a:p>
@@ -5401,7 +5401,7 @@
           <a:p>
             <a:fld id="{FAFDAFBD-AA74-4F39-B34D-B8A0CE5CD8B0}" type="datetimeFigureOut">
               <a:rPr lang="en-US" smtClean="0"/>
-              <a:t>5/10/2024</a:t>
+              <a:t>7/21/2024</a:t>
             </a:fld>
             <a:endParaRPr lang="en-US"/>
           </a:p>
@@ -5633,7 +5633,7 @@
           <a:p>
             <a:fld id="{FAFDAFBD-AA74-4F39-B34D-B8A0CE5CD8B0}" type="datetimeFigureOut">
               <a:rPr lang="en-US" smtClean="0"/>
-              <a:t>5/10/2024</a:t>
+              <a:t>7/21/2024</a:t>
             </a:fld>
             <a:endParaRPr lang="en-US"/>
           </a:p>
@@ -6007,7 +6007,7 @@
           <a:p>
             <a:fld id="{FAFDAFBD-AA74-4F39-B34D-B8A0CE5CD8B0}" type="datetimeFigureOut">
               <a:rPr lang="en-US" smtClean="0"/>
-              <a:t>5/10/2024</a:t>
+              <a:t>7/21/2024</a:t>
             </a:fld>
             <a:endParaRPr lang="en-US"/>
           </a:p>
@@ -6130,7 +6130,7 @@
           <a:p>
             <a:fld id="{FAFDAFBD-AA74-4F39-B34D-B8A0CE5CD8B0}" type="datetimeFigureOut">
               <a:rPr lang="en-US" smtClean="0"/>
-              <a:t>5/10/2024</a:t>
+              <a:t>7/21/2024</a:t>
             </a:fld>
             <a:endParaRPr lang="en-US"/>
           </a:p>
@@ -6225,7 +6225,7 @@
           <a:p>
             <a:fld id="{FAFDAFBD-AA74-4F39-B34D-B8A0CE5CD8B0}" type="datetimeFigureOut">
               <a:rPr lang="en-US" smtClean="0"/>
-              <a:t>5/10/2024</a:t>
+              <a:t>7/21/2024</a:t>
             </a:fld>
             <a:endParaRPr lang="en-US"/>
           </a:p>
@@ -6480,7 +6480,7 @@
           <a:p>
             <a:fld id="{FAFDAFBD-AA74-4F39-B34D-B8A0CE5CD8B0}" type="datetimeFigureOut">
               <a:rPr lang="en-US" smtClean="0"/>
-              <a:t>5/10/2024</a:t>
+              <a:t>7/21/2024</a:t>
             </a:fld>
             <a:endParaRPr lang="en-US"/>
           </a:p>
@@ -6666,7 +6666,7 @@
           <a:p>
             <a:fld id="{FAFDAFBD-AA74-4F39-B34D-B8A0CE5CD8B0}" type="datetimeFigureOut">
               <a:rPr lang="en-US" smtClean="0"/>
-              <a:t>5/10/2024</a:t>
+              <a:t>7/21/2024</a:t>
             </a:fld>
             <a:endParaRPr lang="en-US"/>
           </a:p>
@@ -6941,7 +6941,7 @@
           <a:p>
             <a:fld id="{FAFDAFBD-AA74-4F39-B34D-B8A0CE5CD8B0}" type="datetimeFigureOut">
               <a:rPr lang="en-US" smtClean="0"/>
-              <a:t>5/10/2024</a:t>
+              <a:t>7/21/2024</a:t>
             </a:fld>
             <a:endParaRPr lang="en-US"/>
           </a:p>
@@ -7192,7 +7192,7 @@
           <a:p>
             <a:fld id="{FAFDAFBD-AA74-4F39-B34D-B8A0CE5CD8B0}" type="datetimeFigureOut">
               <a:rPr lang="en-US" smtClean="0"/>
-              <a:t>5/10/2024</a:t>
+              <a:t>7/21/2024</a:t>
             </a:fld>
             <a:endParaRPr lang="en-US"/>
           </a:p>
@@ -7506,7 +7506,7 @@
           <a:p>
             <a:fld id="{FAFDAFBD-AA74-4F39-B34D-B8A0CE5CD8B0}" type="datetimeFigureOut">
               <a:rPr lang="en-US" smtClean="0"/>
-              <a:t>5/10/2024</a:t>
+              <a:t>7/21/2024</a:t>
             </a:fld>
             <a:endParaRPr lang="en-US"/>
           </a:p>
@@ -7847,7 +7847,7 @@
           <a:p>
             <a:fld id="{FAFDAFBD-AA74-4F39-B34D-B8A0CE5CD8B0}" type="datetimeFigureOut">
               <a:rPr lang="en-US" smtClean="0"/>
-              <a:t>5/10/2024</a:t>
+              <a:t>7/21/2024</a:t>
             </a:fld>
             <a:endParaRPr lang="en-US"/>
           </a:p>
@@ -8161,7 +8161,7 @@
           <a:p>
             <a:fld id="{FAFDAFBD-AA74-4F39-B34D-B8A0CE5CD8B0}" type="datetimeFigureOut">
               <a:rPr lang="en-US" smtClean="0"/>
-              <a:t>5/10/2024</a:t>
+              <a:t>7/21/2024</a:t>
             </a:fld>
             <a:endParaRPr lang="en-US"/>
           </a:p>
@@ -8554,7 +8554,7 @@
           <a:p>
             <a:fld id="{FAFDAFBD-AA74-4F39-B34D-B8A0CE5CD8B0}" type="datetimeFigureOut">
               <a:rPr lang="en-US" smtClean="0"/>
-              <a:t>5/10/2024</a:t>
+              <a:t>7/21/2024</a:t>
             </a:fld>
             <a:endParaRPr lang="en-US"/>
           </a:p>
@@ -8724,7 +8724,7 @@
           <a:p>
             <a:fld id="{FAFDAFBD-AA74-4F39-B34D-B8A0CE5CD8B0}" type="datetimeFigureOut">
               <a:rPr lang="en-US" smtClean="0"/>
-              <a:t>5/10/2024</a:t>
+              <a:t>7/21/2024</a:t>
             </a:fld>
             <a:endParaRPr lang="en-US"/>
           </a:p>
@@ -8904,7 +8904,7 @@
           <a:p>
             <a:fld id="{FAFDAFBD-AA74-4F39-B34D-B8A0CE5CD8B0}" type="datetimeFigureOut">
               <a:rPr lang="en-US" smtClean="0"/>
-              <a:t>5/10/2024</a:t>
+              <a:t>7/21/2024</a:t>
             </a:fld>
             <a:endParaRPr lang="en-US"/>
           </a:p>
@@ -9167,7 +9167,7 @@
           <a:p>
             <a:fld id="{FAFDAFBD-AA74-4F39-B34D-B8A0CE5CD8B0}" type="datetimeFigureOut">
               <a:rPr lang="en-US" smtClean="0"/>
-              <a:t>5/10/2024</a:t>
+              <a:t>7/21/2024</a:t>
             </a:fld>
             <a:endParaRPr lang="en-US"/>
           </a:p>
@@ -9432,7 +9432,7 @@
           <a:p>
             <a:fld id="{FAFDAFBD-AA74-4F39-B34D-B8A0CE5CD8B0}" type="datetimeFigureOut">
               <a:rPr lang="en-US" smtClean="0"/>
-              <a:t>5/10/2024</a:t>
+              <a:t>7/21/2024</a:t>
             </a:fld>
             <a:endParaRPr lang="en-US"/>
           </a:p>
@@ -9844,7 +9844,7 @@
           <a:p>
             <a:fld id="{FAFDAFBD-AA74-4F39-B34D-B8A0CE5CD8B0}" type="datetimeFigureOut">
               <a:rPr lang="en-US" smtClean="0"/>
-              <a:t>5/10/2024</a:t>
+              <a:t>7/21/2024</a:t>
             </a:fld>
             <a:endParaRPr lang="en-US"/>
           </a:p>
@@ -9985,7 +9985,7 @@
           <a:p>
             <a:fld id="{FAFDAFBD-AA74-4F39-B34D-B8A0CE5CD8B0}" type="datetimeFigureOut">
               <a:rPr lang="en-US" smtClean="0"/>
-              <a:t>5/10/2024</a:t>
+              <a:t>7/21/2024</a:t>
             </a:fld>
             <a:endParaRPr lang="en-US"/>
           </a:p>
@@ -10098,7 +10098,7 @@
           <a:p>
             <a:fld id="{FAFDAFBD-AA74-4F39-B34D-B8A0CE5CD8B0}" type="datetimeFigureOut">
               <a:rPr lang="en-US" smtClean="0"/>
-              <a:t>5/10/2024</a:t>
+              <a:t>7/21/2024</a:t>
             </a:fld>
             <a:endParaRPr lang="en-US"/>
           </a:p>
@@ -10409,7 +10409,7 @@
           <a:p>
             <a:fld id="{FAFDAFBD-AA74-4F39-B34D-B8A0CE5CD8B0}" type="datetimeFigureOut">
               <a:rPr lang="en-US" smtClean="0"/>
-              <a:t>5/10/2024</a:t>
+              <a:t>7/21/2024</a:t>
             </a:fld>
             <a:endParaRPr lang="en-US"/>
           </a:p>
@@ -10697,7 +10697,7 @@
           <a:p>
             <a:fld id="{FAFDAFBD-AA74-4F39-B34D-B8A0CE5CD8B0}" type="datetimeFigureOut">
               <a:rPr lang="en-US" smtClean="0"/>
-              <a:t>5/10/2024</a:t>
+              <a:t>7/21/2024</a:t>
             </a:fld>
             <a:endParaRPr lang="en-US"/>
           </a:p>
@@ -10938,7 +10938,7 @@
           <a:p>
             <a:fld id="{FAFDAFBD-AA74-4F39-B34D-B8A0CE5CD8B0}" type="datetimeFigureOut">
               <a:rPr lang="en-US" smtClean="0"/>
-              <a:t>5/10/2024</a:t>
+              <a:t>7/21/2024</a:t>
             </a:fld>
             <a:endParaRPr lang="en-US"/>
           </a:p>
@@ -12020,7 +12020,7 @@
           <a:p>
             <a:fld id="{FAFDAFBD-AA74-4F39-B34D-B8A0CE5CD8B0}" type="datetimeFigureOut">
               <a:rPr lang="en-US" smtClean="0"/>
-              <a:t>5/10/2024</a:t>
+              <a:t>7/21/2024</a:t>
             </a:fld>
             <a:endParaRPr lang="en-US"/>
           </a:p>
@@ -24471,8 +24471,8 @@
         </p:blipFill>
         <p:spPr>
           <a:xfrm>
-            <a:off x="1039090" y="1578919"/>
-            <a:ext cx="2228212" cy="2228212"/>
+            <a:off x="1065013" y="1145792"/>
+            <a:ext cx="2049795" cy="2049795"/>
           </a:xfrm>
           <a:prstGeom prst="rect">
             <a:avLst/>
@@ -24493,7 +24493,7 @@
         </p:nvSpPr>
         <p:spPr>
           <a:xfrm>
-            <a:off x="4225637" y="1020663"/>
+            <a:off x="3426741" y="1020663"/>
             <a:ext cx="6442363" cy="2985433"/>
           </a:xfrm>
           <a:prstGeom prst="rect">
@@ -24601,10 +24601,70 @@
           </a:p>
         </p:txBody>
       </p:sp>
+      <p:pic>
+        <p:nvPicPr>
+          <p:cNvPr id="2" name="Picture 1">
+            <a:extLst>
+              <a:ext uri="{FF2B5EF4-FFF2-40B4-BE49-F238E27FC236}">
+                <a16:creationId xmlns:a16="http://schemas.microsoft.com/office/drawing/2014/main" id="{1014BE0B-5E89-8A06-24B5-EF1DF4E65AD0}"/>
+              </a:ext>
+            </a:extLst>
+          </p:cNvPr>
+          <p:cNvPicPr>
+            <a:picLocks noChangeAspect="1"/>
+          </p:cNvPicPr>
+          <p:nvPr/>
+        </p:nvPicPr>
+        <p:blipFill>
+          <a:blip r:embed="rId5"/>
+          <a:stretch>
+            <a:fillRect/>
+          </a:stretch>
+        </p:blipFill>
+        <p:spPr>
+          <a:xfrm>
+            <a:off x="9357879" y="4371263"/>
+            <a:ext cx="1628368" cy="1616653"/>
+          </a:xfrm>
+          <a:prstGeom prst="rect">
+            <a:avLst/>
+          </a:prstGeom>
+        </p:spPr>
+      </p:pic>
+      <p:pic>
+        <p:nvPicPr>
+          <p:cNvPr id="14" name="Picture 13">
+            <a:extLst>
+              <a:ext uri="{FF2B5EF4-FFF2-40B4-BE49-F238E27FC236}">
+                <a16:creationId xmlns:a16="http://schemas.microsoft.com/office/drawing/2014/main" id="{E677BCE5-5CCD-CDCE-8476-CA5DF0421C63}"/>
+              </a:ext>
+            </a:extLst>
+          </p:cNvPr>
+          <p:cNvPicPr>
+            <a:picLocks noChangeAspect="1"/>
+          </p:cNvPicPr>
+          <p:nvPr/>
+        </p:nvPicPr>
+        <p:blipFill>
+          <a:blip r:embed="rId6"/>
+          <a:stretch>
+            <a:fillRect/>
+          </a:stretch>
+        </p:blipFill>
+        <p:spPr>
+          <a:xfrm>
+            <a:off x="8505416" y="1315960"/>
+            <a:ext cx="2308474" cy="1879627"/>
+          </a:xfrm>
+          <a:prstGeom prst="rect">
+            <a:avLst/>
+          </a:prstGeom>
+        </p:spPr>
+      </p:pic>
     </p:spTree>
     <p:extLst>
       <p:ext uri="{BB962C8B-B14F-4D97-AF65-F5344CB8AC3E}">
-        <p14:creationId xmlns:p14="http://schemas.microsoft.com/office/powerpoint/2010/main" val="918283133"/>
+        <p14:creationId xmlns:p14="http://schemas.microsoft.com/office/powerpoint/2010/main" val="904236353"/>
       </p:ext>
     </p:extLst>
   </p:cSld>

</xml_diff>